<commit_message>
Dream Team Project 1
</commit_message>
<xml_diff>
--- a/Firearm Registration correlated to state_0725.pptx
+++ b/Firearm Registration correlated to state_0725.pptx
@@ -6,13 +6,16 @@
   </p:sldMasterIdLst>
   <p:sldIdLst>
     <p:sldId id="256" r:id="rId2"/>
-    <p:sldId id="260" r:id="rId3"/>
+    <p:sldId id="269" r:id="rId3"/>
     <p:sldId id="262" r:id="rId4"/>
     <p:sldId id="263" r:id="rId5"/>
     <p:sldId id="265" r:id="rId6"/>
     <p:sldId id="267" r:id="rId7"/>
-    <p:sldId id="268" r:id="rId8"/>
-    <p:sldId id="259" r:id="rId9"/>
+    <p:sldId id="271" r:id="rId8"/>
+    <p:sldId id="270" r:id="rId9"/>
+    <p:sldId id="268" r:id="rId10"/>
+    <p:sldId id="260" r:id="rId11"/>
+    <p:sldId id="259" r:id="rId12"/>
   </p:sldIdLst>
   <p:sldSz cx="12192000" cy="6858000"/>
   <p:notesSz cx="6858000" cy="9144000"/>
@@ -258,7 +261,7 @@
           <a:p>
             <a:fld id="{48A87A34-81AB-432B-8DAE-1953F412C126}" type="datetimeFigureOut">
               <a:rPr lang="en-US" smtClean="0"/>
-              <a:t>7/25/2019</a:t>
+              <a:t>7/26/2019</a:t>
             </a:fld>
             <a:endParaRPr lang="en-US" dirty="0"/>
           </a:p>
@@ -478,7 +481,7 @@
           <a:p>
             <a:fld id="{48A87A34-81AB-432B-8DAE-1953F412C126}" type="datetimeFigureOut">
               <a:rPr lang="en-US" smtClean="0"/>
-              <a:t>7/25/2019</a:t>
+              <a:t>7/26/2019</a:t>
             </a:fld>
             <a:endParaRPr lang="en-US" dirty="0"/>
           </a:p>
@@ -702,7 +705,7 @@
           <a:p>
             <a:fld id="{48A87A34-81AB-432B-8DAE-1953F412C126}" type="datetimeFigureOut">
               <a:rPr lang="en-US" smtClean="0"/>
-              <a:t>7/25/2019</a:t>
+              <a:t>7/26/2019</a:t>
             </a:fld>
             <a:endParaRPr lang="en-US" dirty="0"/>
           </a:p>
@@ -917,7 +920,7 @@
             <a:fld id="{48A87A34-81AB-432B-8DAE-1953F412C126}" type="datetimeFigureOut">
               <a:rPr lang="en-US" smtClean="0"/>
               <a:pPr/>
-              <a:t>7/25/2019</a:t>
+              <a:t>7/26/2019</a:t>
             </a:fld>
             <a:endParaRPr lang="en-US" dirty="0"/>
           </a:p>
@@ -1209,7 +1212,7 @@
           <a:p>
             <a:fld id="{48A87A34-81AB-432B-8DAE-1953F412C126}" type="datetimeFigureOut">
               <a:rPr lang="en-US" smtClean="0"/>
-              <a:t>7/25/2019</a:t>
+              <a:t>7/26/2019</a:t>
             </a:fld>
             <a:endParaRPr lang="en-US" dirty="0"/>
           </a:p>
@@ -1486,7 +1489,7 @@
           <a:p>
             <a:fld id="{48A87A34-81AB-432B-8DAE-1953F412C126}" type="datetimeFigureOut">
               <a:rPr lang="en-US" smtClean="0"/>
-              <a:t>7/25/2019</a:t>
+              <a:t>7/26/2019</a:t>
             </a:fld>
             <a:endParaRPr lang="en-US" dirty="0"/>
           </a:p>
@@ -1911,7 +1914,7 @@
           <a:p>
             <a:fld id="{48A87A34-81AB-432B-8DAE-1953F412C126}" type="datetimeFigureOut">
               <a:rPr lang="en-US" smtClean="0"/>
-              <a:t>7/25/2019</a:t>
+              <a:t>7/26/2019</a:t>
             </a:fld>
             <a:endParaRPr lang="en-US" dirty="0"/>
           </a:p>
@@ -2069,7 +2072,7 @@
           <a:p>
             <a:fld id="{48A87A34-81AB-432B-8DAE-1953F412C126}" type="datetimeFigureOut">
               <a:rPr lang="en-US" smtClean="0"/>
-              <a:t>7/25/2019</a:t>
+              <a:t>7/26/2019</a:t>
             </a:fld>
             <a:endParaRPr lang="en-US" dirty="0"/>
           </a:p>
@@ -2204,7 +2207,7 @@
           <a:p>
             <a:fld id="{48A87A34-81AB-432B-8DAE-1953F412C126}" type="datetimeFigureOut">
               <a:rPr lang="en-US" smtClean="0"/>
-              <a:t>7/25/2019</a:t>
+              <a:t>7/26/2019</a:t>
             </a:fld>
             <a:endParaRPr lang="en-US" dirty="0"/>
           </a:p>
@@ -2455,7 +2458,7 @@
           <a:p>
             <a:fld id="{48A87A34-81AB-432B-8DAE-1953F412C126}" type="datetimeFigureOut">
               <a:rPr lang="en-US" smtClean="0"/>
-              <a:t>7/25/2019</a:t>
+              <a:t>7/26/2019</a:t>
             </a:fld>
             <a:endParaRPr lang="en-US" dirty="0"/>
           </a:p>
@@ -2916,7 +2919,7 @@
             <a:fld id="{48A87A34-81AB-432B-8DAE-1953F412C126}" type="datetimeFigureOut">
               <a:rPr lang="en-US" smtClean="0"/>
               <a:pPr/>
-              <a:t>7/25/2019</a:t>
+              <a:t>7/26/2019</a:t>
             </a:fld>
             <a:endParaRPr lang="en-US" dirty="0"/>
           </a:p>
@@ -3299,7 +3302,7 @@
             <a:fld id="{48A87A34-81AB-432B-8DAE-1953F412C126}" type="datetimeFigureOut">
               <a:rPr lang="en-US" smtClean="0"/>
               <a:pPr/>
-              <a:t>7/25/2019</a:t>
+              <a:t>7/26/2019</a:t>
             </a:fld>
             <a:endParaRPr lang="en-US" dirty="0"/>
           </a:p>
@@ -3934,7 +3937,7 @@
 </p:sld>
 </file>
 
-<file path=ppt/slides/slide2.xml><?xml version="1.0" encoding="utf-8"?>
+<file path=ppt/slides/slide10.xml><?xml version="1.0" encoding="utf-8"?>
 <p:sld xmlns:a="http://schemas.openxmlformats.org/drawingml/2006/main" xmlns:r="http://schemas.openxmlformats.org/officeDocument/2006/relationships" xmlns:p="http://schemas.openxmlformats.org/presentationml/2006/main">
   <p:cSld>
     <p:spTree>
@@ -4015,7 +4018,7 @@
         </p:spPr>
         <p:txBody>
           <a:bodyPr>
-            <a:normAutofit fontScale="92500" lnSpcReduction="10000"/>
+            <a:normAutofit/>
           </a:bodyPr>
           <a:lstStyle/>
           <a:p>
@@ -4028,7 +4031,20 @@
                 <a:latin typeface="Cambria" panose="02040503050406030204" pitchFamily="18" charset="0"/>
                 <a:ea typeface="Cambria" panose="02040503050406030204" pitchFamily="18" charset="0"/>
               </a:rPr>
-              <a:t>Gun violence in the United States results in thousands of deaths and injuries each year.</a:t>
+              <a:t>Percentage of homes with firearms has fluctuated between 37-45% since 2000(Statista). </a:t>
+            </a:r>
+          </a:p>
+          <a:p>
+            <a:pPr marL="285750" indent="-285750">
+              <a:buFont typeface="Arial" panose="020B0604020202020204" pitchFamily="34" charset="0"/>
+              <a:buChar char="•"/>
+            </a:pPr>
+            <a:r>
+              <a:rPr lang="en-US" dirty="0">
+                <a:latin typeface="Cambria" panose="02040503050406030204" pitchFamily="18" charset="0"/>
+                <a:ea typeface="Cambria" panose="02040503050406030204" pitchFamily="18" charset="0"/>
+              </a:rPr>
+              <a:t>Approximately 30 million participating in firearms target shoots(Statista) .</a:t>
             </a:r>
           </a:p>
           <a:p>
@@ -4054,7 +4070,7 @@
                 <a:latin typeface="Cambria" panose="02040503050406030204" pitchFamily="18" charset="0"/>
                 <a:ea typeface="Cambria" panose="02040503050406030204" pitchFamily="18" charset="0"/>
               </a:rPr>
-              <a:t>In 2017 alone, 11 mass shootings in the US caused 117 fatalities and 587 injuries occurring in concert, religious, workplace, airport, and shopping venues and in the community.</a:t>
+              <a:t>10,982 murders by various firearms in 2017,  at least 7,032 by handguns (Statista) </a:t>
             </a:r>
           </a:p>
           <a:p>
@@ -4067,7 +4083,7 @@
                 <a:latin typeface="Cambria" panose="02040503050406030204" pitchFamily="18" charset="0"/>
                 <a:ea typeface="Cambria" panose="02040503050406030204" pitchFamily="18" charset="0"/>
               </a:rPr>
-              <a:t>On June 12, 2016 at Pulse Nightclub, a single shooter killed 49 people and injured 53. It was the worst mass shooting in US history until the mass shooting in Las Vegas in October 2017 took 58 lives and left 546 injured. </a:t>
+              <a:t>In 2015, 2,824 children (age 0 to 19 years) died by gunshot and an additional 13,723 were injured.</a:t>
             </a:r>
           </a:p>
           <a:p>
@@ -4081,46 +4097,6 @@
                 <a:ea typeface="Cambria" panose="02040503050406030204" pitchFamily="18" charset="0"/>
               </a:rPr>
               <a:t>Approximately one of three handguns guns is kept loaded and unlocked and most children know where their parents keep their guns.</a:t>
-            </a:r>
-          </a:p>
-          <a:p>
-            <a:pPr marL="285750" indent="-285750">
-              <a:buFont typeface="Arial" panose="020B0604020202020204" pitchFamily="34" charset="0"/>
-              <a:buChar char="•"/>
-            </a:pPr>
-            <a:r>
-              <a:rPr lang="en-US" dirty="0">
-                <a:latin typeface="Cambria" panose="02040503050406030204" pitchFamily="18" charset="0"/>
-                <a:ea typeface="Cambria" panose="02040503050406030204" pitchFamily="18" charset="0"/>
-              </a:rPr>
-              <a:t>In 2015, 2,824 children (age 0 to 19 years) died by gunshot and an additional 13,723 were injured.</a:t>
-            </a:r>
-          </a:p>
-          <a:p>
-            <a:pPr marL="285750" indent="-285750">
-              <a:buFont typeface="Arial" panose="020B0604020202020204" pitchFamily="34" charset="0"/>
-              <a:buChar char="•"/>
-            </a:pPr>
-            <a:r>
-              <a:rPr lang="en-US" dirty="0">
-                <a:latin typeface="Cambria" panose="02040503050406030204" pitchFamily="18" charset="0"/>
-                <a:ea typeface="Cambria" panose="02040503050406030204" pitchFamily="18" charset="0"/>
-              </a:rPr>
-              <a:t>According to the CDC, </a:t>
-            </a:r>
-            <a:r>
-              <a:rPr lang="en-US" dirty="0" err="1">
-                <a:latin typeface="Cambria" panose="02040503050406030204" pitchFamily="18" charset="0"/>
-                <a:ea typeface="Cambria" panose="02040503050406030204" pitchFamily="18" charset="0"/>
-              </a:rPr>
-              <a:t>threre</a:t>
-            </a:r>
-            <a:r>
-              <a:rPr lang="en-US" dirty="0">
-                <a:latin typeface="Cambria" panose="02040503050406030204" pitchFamily="18" charset="0"/>
-                <a:ea typeface="Cambria" panose="02040503050406030204" pitchFamily="18" charset="0"/>
-              </a:rPr>
-              <a:t> were 1,555 firearm fatalities in Pennsylvania in 2016.</a:t>
             </a:r>
           </a:p>
           <a:p>
@@ -4138,6 +4114,16 @@
               <a:buFont typeface="Arial" panose="020B0604020202020204" pitchFamily="34" charset="0"/>
               <a:buChar char="•"/>
             </a:pPr>
+            <a:endParaRPr lang="en-US" dirty="0">
+              <a:latin typeface="Cambria" panose="02040503050406030204" pitchFamily="18" charset="0"/>
+              <a:ea typeface="Cambria" panose="02040503050406030204" pitchFamily="18" charset="0"/>
+            </a:endParaRPr>
+          </a:p>
+          <a:p>
+            <a:pPr marL="285750" indent="-285750">
+              <a:buFont typeface="Arial" panose="020B0604020202020204" pitchFamily="34" charset="0"/>
+              <a:buChar char="•"/>
+            </a:pPr>
             <a:endParaRPr lang="en-US" sz="1600" dirty="0">
               <a:latin typeface="Cambria" panose="02040503050406030204" pitchFamily="18" charset="0"/>
               <a:ea typeface="Cambria" panose="02040503050406030204" pitchFamily="18" charset="0"/>
@@ -4161,6 +4147,880 @@
     <p:extLst>
       <p:ext uri="{BB962C8B-B14F-4D97-AF65-F5344CB8AC3E}">
         <p14:creationId xmlns:p14="http://schemas.microsoft.com/office/powerpoint/2010/main" val="2939235762"/>
+      </p:ext>
+    </p:extLst>
+  </p:cSld>
+  <p:clrMapOvr>
+    <a:masterClrMapping/>
+  </p:clrMapOvr>
+</p:sld>
+</file>
+
+<file path=ppt/slides/slide11.xml><?xml version="1.0" encoding="utf-8"?>
+<p:sld xmlns:a="http://schemas.openxmlformats.org/drawingml/2006/main" xmlns:r="http://schemas.openxmlformats.org/officeDocument/2006/relationships" xmlns:p="http://schemas.openxmlformats.org/presentationml/2006/main">
+  <p:cSld>
+    <p:spTree>
+      <p:nvGrpSpPr>
+        <p:cNvPr id="1" name=""/>
+        <p:cNvGrpSpPr/>
+        <p:nvPr/>
+      </p:nvGrpSpPr>
+      <p:grpSpPr>
+        <a:xfrm>
+          <a:off x="0" y="0"/>
+          <a:ext cx="0" cy="0"/>
+          <a:chOff x="0" y="0"/>
+          <a:chExt cx="0" cy="0"/>
+        </a:xfrm>
+      </p:grpSpPr>
+      <p:sp>
+        <p:nvSpPr>
+          <p:cNvPr id="2" name="Title 1">
+            <a:extLst>
+              <a:ext uri="{FF2B5EF4-FFF2-40B4-BE49-F238E27FC236}">
+                <a16:creationId xmlns:a16="http://schemas.microsoft.com/office/drawing/2014/main" id="{871AFE62-1177-4408-A28F-EF30AA4C24FA}"/>
+              </a:ext>
+            </a:extLst>
+          </p:cNvPr>
+          <p:cNvSpPr>
+            <a:spLocks noGrp="1"/>
+          </p:cNvSpPr>
+          <p:nvPr>
+            <p:ph type="title"/>
+          </p:nvPr>
+        </p:nvSpPr>
+        <p:spPr>
+          <a:xfrm>
+            <a:off x="1129166" y="841732"/>
+            <a:ext cx="8619060" cy="444145"/>
+          </a:xfrm>
+        </p:spPr>
+        <p:txBody>
+          <a:bodyPr>
+            <a:normAutofit fontScale="90000"/>
+          </a:bodyPr>
+          <a:lstStyle/>
+          <a:p>
+            <a:br>
+              <a:rPr lang="en-US" dirty="0">
+                <a:latin typeface="Cambria" panose="02040503050406030204" pitchFamily="18" charset="0"/>
+                <a:ea typeface="Cambria" panose="02040503050406030204" pitchFamily="18" charset="0"/>
+              </a:rPr>
+            </a:br>
+            <a:r>
+              <a:rPr lang="en-US" sz="2700" dirty="0">
+                <a:latin typeface="Cambria" panose="02040503050406030204" pitchFamily="18" charset="0"/>
+                <a:ea typeface="Cambria" panose="02040503050406030204" pitchFamily="18" charset="0"/>
+              </a:rPr>
+              <a:t>References:</a:t>
+            </a:r>
+            <a:endParaRPr lang="en-US" dirty="0">
+              <a:latin typeface="Cambria" panose="02040503050406030204" pitchFamily="18" charset="0"/>
+              <a:ea typeface="Cambria" panose="02040503050406030204" pitchFamily="18" charset="0"/>
+            </a:endParaRPr>
+          </a:p>
+        </p:txBody>
+      </p:sp>
+      <p:sp>
+        <p:nvSpPr>
+          <p:cNvPr id="3" name="Text Placeholder 2">
+            <a:extLst>
+              <a:ext uri="{FF2B5EF4-FFF2-40B4-BE49-F238E27FC236}">
+                <a16:creationId xmlns:a16="http://schemas.microsoft.com/office/drawing/2014/main" id="{0E4F5FD9-B3FE-4E5E-8E72-026B7B315BEA}"/>
+              </a:ext>
+            </a:extLst>
+          </p:cNvPr>
+          <p:cNvSpPr>
+            <a:spLocks noGrp="1"/>
+          </p:cNvSpPr>
+          <p:nvPr>
+            <p:ph type="body" idx="1"/>
+          </p:nvPr>
+        </p:nvSpPr>
+        <p:spPr>
+          <a:xfrm>
+            <a:off x="1129166" y="1514477"/>
+            <a:ext cx="8619060" cy="3304648"/>
+          </a:xfrm>
+        </p:spPr>
+        <p:txBody>
+          <a:bodyPr>
+            <a:normAutofit/>
+          </a:bodyPr>
+          <a:lstStyle/>
+          <a:p>
+            <a:r>
+              <a:rPr lang="en-US" sz="1400" dirty="0">
+                <a:latin typeface="Cambria" panose="02040503050406030204" pitchFamily="18" charset="0"/>
+                <a:ea typeface="Cambria" panose="02040503050406030204" pitchFamily="18" charset="0"/>
+              </a:rPr>
+              <a:t>CDC (2015). Injury mortality reports 1999 and onwards (USA). In Web-based Injury Statistics Query and Reporting System / CDC WISQARS. Atlanta: National Center for Injury Prevention and Control, Centers for Disease Control and Prevention / CDC. </a:t>
+            </a:r>
+          </a:p>
+          <a:p>
+            <a:r>
+              <a:rPr lang="en-US" sz="1400" dirty="0">
+                <a:latin typeface="Cambria" panose="02040503050406030204" pitchFamily="18" charset="0"/>
+                <a:ea typeface="Cambria" panose="02040503050406030204" pitchFamily="18" charset="0"/>
+                <a:hlinkClick r:id="rId2"/>
+              </a:rPr>
+              <a:t>https://www.statista.com/statistics/249740/percentage-of-households-in-the-united-states-owning-a-firearm/</a:t>
+            </a:r>
+            <a:r>
+              <a:rPr lang="en-US" sz="1400" dirty="0">
+                <a:latin typeface="Cambria" panose="02040503050406030204" pitchFamily="18" charset="0"/>
+                <a:ea typeface="Cambria" panose="02040503050406030204" pitchFamily="18" charset="0"/>
+              </a:rPr>
+              <a:t> </a:t>
+            </a:r>
+          </a:p>
+          <a:p>
+            <a:r>
+              <a:rPr lang="en-US" sz="1400" dirty="0">
+                <a:latin typeface="Cambria" panose="02040503050406030204" pitchFamily="18" charset="0"/>
+                <a:ea typeface="Cambria" panose="02040503050406030204" pitchFamily="18" charset="0"/>
+                <a:hlinkClick r:id="rId3"/>
+              </a:rPr>
+              <a:t>https://www.statista.com/statistics/191962/participants-in-target-shooting-in-the-us-since-2006/</a:t>
+            </a:r>
+            <a:endParaRPr lang="en-US" sz="1400" dirty="0">
+              <a:latin typeface="Cambria" panose="02040503050406030204" pitchFamily="18" charset="0"/>
+              <a:ea typeface="Cambria" panose="02040503050406030204" pitchFamily="18" charset="0"/>
+            </a:endParaRPr>
+          </a:p>
+          <a:p>
+            <a:r>
+              <a:rPr lang="en-US" sz="1400" dirty="0">
+                <a:latin typeface="Cambria" panose="02040503050406030204" pitchFamily="18" charset="0"/>
+                <a:ea typeface="Cambria" panose="02040503050406030204" pitchFamily="18" charset="0"/>
+                <a:hlinkClick r:id="rId4"/>
+              </a:rPr>
+              <a:t>https://www.statista.com/statistics/195325/murder-victims-in-the-us-by-weapon-used/</a:t>
+            </a:r>
+            <a:endParaRPr lang="en-US" sz="1400" dirty="0">
+              <a:latin typeface="Cambria" panose="02040503050406030204" pitchFamily="18" charset="0"/>
+              <a:ea typeface="Cambria" panose="02040503050406030204" pitchFamily="18" charset="0"/>
+            </a:endParaRPr>
+          </a:p>
+          <a:p>
+            <a:r>
+              <a:rPr lang="en-US" sz="1400" dirty="0"/>
+              <a:t>NICS &amp; NIBRS, www.fbi.gov</a:t>
+            </a:r>
+            <a:endParaRPr lang="en-US" sz="1400" dirty="0">
+              <a:latin typeface="Cambria" panose="02040503050406030204" pitchFamily="18" charset="0"/>
+              <a:ea typeface="Cambria" panose="02040503050406030204" pitchFamily="18" charset="0"/>
+            </a:endParaRPr>
+          </a:p>
+        </p:txBody>
+      </p:sp>
+    </p:spTree>
+    <p:extLst>
+      <p:ext uri="{BB962C8B-B14F-4D97-AF65-F5344CB8AC3E}">
+        <p14:creationId xmlns:p14="http://schemas.microsoft.com/office/powerpoint/2010/main" val="1521603729"/>
+      </p:ext>
+    </p:extLst>
+  </p:cSld>
+  <p:clrMapOvr>
+    <a:masterClrMapping/>
+  </p:clrMapOvr>
+</p:sld>
+</file>
+
+<file path=ppt/slides/slide2.xml><?xml version="1.0" encoding="utf-8"?>
+<p:sld xmlns:a="http://schemas.openxmlformats.org/drawingml/2006/main" xmlns:r="http://schemas.openxmlformats.org/officeDocument/2006/relationships" xmlns:p="http://schemas.openxmlformats.org/presentationml/2006/main">
+  <p:cSld>
+    <p:bg>
+      <p:bgPr>
+        <a:gradFill rotWithShape="1">
+          <a:gsLst>
+            <a:gs pos="0">
+              <a:schemeClr val="bg1">
+                <a:tint val="94000"/>
+                <a:satMod val="80000"/>
+                <a:lumMod val="106000"/>
+              </a:schemeClr>
+            </a:gs>
+            <a:gs pos="100000">
+              <a:schemeClr val="bg1">
+                <a:shade val="80000"/>
+                <a:lumMod val="108000"/>
+              </a:schemeClr>
+            </a:gs>
+          </a:gsLst>
+          <a:path path="circle">
+            <a:fillToRect l="43000" r="43000" b="100000"/>
+          </a:path>
+        </a:gradFill>
+        <a:effectLst/>
+      </p:bgPr>
+    </p:bg>
+    <p:spTree>
+      <p:nvGrpSpPr>
+        <p:cNvPr id="1" name=""/>
+        <p:cNvGrpSpPr/>
+        <p:nvPr/>
+      </p:nvGrpSpPr>
+      <p:grpSpPr>
+        <a:xfrm>
+          <a:off x="0" y="0"/>
+          <a:ext cx="0" cy="0"/>
+          <a:chOff x="0" y="0"/>
+          <a:chExt cx="0" cy="0"/>
+        </a:xfrm>
+      </p:grpSpPr>
+      <p:pic>
+        <p:nvPicPr>
+          <p:cNvPr id="9" name="Picture 8">
+            <a:extLst>
+              <a:ext uri="{FF2B5EF4-FFF2-40B4-BE49-F238E27FC236}">
+                <a16:creationId xmlns:a16="http://schemas.microsoft.com/office/drawing/2014/main" id="{CB1DE69F-569C-4A49-8E50-4093C135AECF}"/>
+              </a:ext>
+              <a:ext uri="{C183D7F6-B498-43B3-948B-1728B52AA6E4}">
+                <adec:decorative xmlns:adec="http://schemas.microsoft.com/office/drawing/2017/decorative" val="1"/>
+              </a:ext>
+            </a:extLst>
+          </p:cNvPr>
+          <p:cNvPicPr>
+            <a:picLocks noGrp="1" noRot="1" noChangeAspect="1" noMove="1" noResize="1" noEditPoints="1" noAdjustHandles="1" noChangeArrowheads="1" noChangeShapeType="1" noCrop="1"/>
+          </p:cNvPicPr>
+          <p:nvPr>
+            <p:extLst>
+              <p:ext uri="{386F3935-93C4-4BCD-93E2-E3B085C9AB24}">
+                <p16:designElem xmlns:p16="http://schemas.microsoft.com/office/powerpoint/2015/main" val="1"/>
+              </p:ext>
+            </p:extLst>
+          </p:nvPr>
+        </p:nvPicPr>
+        <p:blipFill rotWithShape="1">
+          <a:blip r:embed="rId2">
+            <a:extLst>
+              <a:ext uri="{28A0092B-C50C-407E-A947-70E740481C1C}">
+                <a14:useLocalDpi xmlns:a14="http://schemas.microsoft.com/office/drawing/2010/main" val="0"/>
+              </a:ext>
+            </a:extLst>
+          </a:blip>
+          <a:srcRect t="1538" b="-1538"/>
+          <a:stretch/>
+        </p:blipFill>
+        <p:spPr>
+          <a:xfrm>
+            <a:off x="0" y="6119336"/>
+            <a:ext cx="12192000" cy="742950"/>
+          </a:xfrm>
+          <a:prstGeom prst="rect">
+            <a:avLst/>
+          </a:prstGeom>
+        </p:spPr>
+      </p:pic>
+      <p:sp>
+        <p:nvSpPr>
+          <p:cNvPr id="11" name="Rectangle 10">
+            <a:extLst>
+              <a:ext uri="{FF2B5EF4-FFF2-40B4-BE49-F238E27FC236}">
+                <a16:creationId xmlns:a16="http://schemas.microsoft.com/office/drawing/2014/main" id="{50B488F5-9CE4-4346-B22F-600286ED4D8F}"/>
+              </a:ext>
+              <a:ext uri="{C183D7F6-B498-43B3-948B-1728B52AA6E4}">
+                <adec:decorative xmlns:adec="http://schemas.microsoft.com/office/drawing/2017/decorative" val="1"/>
+              </a:ext>
+            </a:extLst>
+          </p:cNvPr>
+          <p:cNvSpPr>
+            <a:spLocks noGrp="1" noRot="1" noChangeAspect="1" noMove="1" noResize="1" noEditPoints="1" noAdjustHandles="1" noChangeArrowheads="1" noChangeShapeType="1" noTextEdit="1"/>
+          </p:cNvSpPr>
+          <p:nvPr>
+            <p:extLst>
+              <p:ext uri="{386F3935-93C4-4BCD-93E2-E3B085C9AB24}">
+                <p16:designElem xmlns:p16="http://schemas.microsoft.com/office/powerpoint/2015/main" val="1"/>
+              </p:ext>
+            </p:extLst>
+          </p:nvPr>
+        </p:nvSpPr>
+        <p:spPr>
+          <a:xfrm>
+            <a:off x="0" y="468769"/>
+            <a:ext cx="12192000" cy="5647024"/>
+          </a:xfrm>
+          <a:prstGeom prst="rect">
+            <a:avLst/>
+          </a:prstGeom>
+          <a:gradFill flip="none" rotWithShape="1">
+            <a:gsLst>
+              <a:gs pos="0">
+                <a:schemeClr val="bg2">
+                  <a:alpha val="0"/>
+                  <a:lumMod val="100000"/>
+                </a:schemeClr>
+              </a:gs>
+              <a:gs pos="100000">
+                <a:schemeClr val="bg2">
+                  <a:lumMod val="95000"/>
+                  <a:lumOff val="5000"/>
+                </a:schemeClr>
+              </a:gs>
+            </a:gsLst>
+            <a:lin ang="5400000" scaled="0"/>
+            <a:tileRect/>
+          </a:gradFill>
+          <a:ln>
+            <a:noFill/>
+          </a:ln>
+        </p:spPr>
+        <p:style>
+          <a:lnRef idx="2">
+            <a:schemeClr val="accent1">
+              <a:shade val="50000"/>
+            </a:schemeClr>
+          </a:lnRef>
+          <a:fillRef idx="1">
+            <a:schemeClr val="accent1"/>
+          </a:fillRef>
+          <a:effectRef idx="0">
+            <a:schemeClr val="accent1"/>
+          </a:effectRef>
+          <a:fontRef idx="minor">
+            <a:schemeClr val="lt1"/>
+          </a:fontRef>
+        </p:style>
+      </p:sp>
+      <p:cxnSp>
+        <p:nvCxnSpPr>
+          <p:cNvPr id="13" name="Straight Connector 12">
+            <a:extLst>
+              <a:ext uri="{FF2B5EF4-FFF2-40B4-BE49-F238E27FC236}">
+                <a16:creationId xmlns:a16="http://schemas.microsoft.com/office/drawing/2014/main" id="{5F76596F-57DF-4A0C-96D9-046DC3B30E9F}"/>
+              </a:ext>
+              <a:ext uri="{C183D7F6-B498-43B3-948B-1728B52AA6E4}">
+                <adec:decorative xmlns:adec="http://schemas.microsoft.com/office/drawing/2017/decorative" val="1"/>
+              </a:ext>
+            </a:extLst>
+          </p:cNvPr>
+          <p:cNvCxnSpPr>
+            <a:cxnSpLocks noGrp="1" noRot="1" noChangeAspect="1" noMove="1" noResize="1" noEditPoints="1" noAdjustHandles="1" noChangeArrowheads="1" noChangeShapeType="1"/>
+          </p:cNvCxnSpPr>
+          <p:nvPr>
+            <p:extLst>
+              <p:ext uri="{386F3935-93C4-4BCD-93E2-E3B085C9AB24}">
+                <p16:designElem xmlns:p16="http://schemas.microsoft.com/office/powerpoint/2015/main" val="1"/>
+              </p:ext>
+            </p:extLst>
+          </p:nvPr>
+        </p:nvCxnSpPr>
+        <p:spPr>
+          <a:xfrm>
+            <a:off x="0" y="6121269"/>
+            <a:ext cx="12192000" cy="0"/>
+          </a:xfrm>
+          <a:prstGeom prst="line">
+            <a:avLst/>
+          </a:prstGeom>
+          <a:ln w="12700">
+            <a:solidFill>
+              <a:srgbClr val="000001">
+                <a:alpha val="20000"/>
+              </a:srgbClr>
+            </a:solidFill>
+          </a:ln>
+        </p:spPr>
+        <p:style>
+          <a:lnRef idx="1">
+            <a:schemeClr val="accent1"/>
+          </a:lnRef>
+          <a:fillRef idx="0">
+            <a:schemeClr val="accent1"/>
+          </a:fillRef>
+          <a:effectRef idx="0">
+            <a:schemeClr val="accent1"/>
+          </a:effectRef>
+          <a:fontRef idx="minor">
+            <a:schemeClr val="tx1"/>
+          </a:fontRef>
+        </p:style>
+      </p:cxnSp>
+      <p:pic>
+        <p:nvPicPr>
+          <p:cNvPr id="15" name="Picture 14">
+            <a:extLst>
+              <a:ext uri="{FF2B5EF4-FFF2-40B4-BE49-F238E27FC236}">
+                <a16:creationId xmlns:a16="http://schemas.microsoft.com/office/drawing/2014/main" id="{16176A8D-754E-4699-9AAC-A833466A201A}"/>
+              </a:ext>
+              <a:ext uri="{C183D7F6-B498-43B3-948B-1728B52AA6E4}">
+                <adec:decorative xmlns:adec="http://schemas.microsoft.com/office/drawing/2017/decorative" val="1"/>
+              </a:ext>
+            </a:extLst>
+          </p:cNvPr>
+          <p:cNvPicPr>
+            <a:picLocks noGrp="1" noRot="1" noChangeAspect="1" noMove="1" noResize="1" noEditPoints="1" noAdjustHandles="1" noChangeArrowheads="1" noChangeShapeType="1" noCrop="1"/>
+          </p:cNvPicPr>
+          <p:nvPr>
+            <p:extLst>
+              <p:ext uri="{386F3935-93C4-4BCD-93E2-E3B085C9AB24}">
+                <p16:designElem xmlns:p16="http://schemas.microsoft.com/office/powerpoint/2015/main" val="1"/>
+              </p:ext>
+            </p:extLst>
+          </p:nvPr>
+        </p:nvPicPr>
+        <p:blipFill rotWithShape="1">
+          <a:blip r:embed="rId3">
+            <a:duotone>
+              <a:schemeClr val="accent1">
+                <a:shade val="45000"/>
+                <a:satMod val="135000"/>
+              </a:schemeClr>
+              <a:prstClr val="white"/>
+            </a:duotone>
+            <a:extLst>
+              <a:ext uri="{28A0092B-C50C-407E-A947-70E740481C1C}">
+                <a14:useLocalDpi xmlns:a14="http://schemas.microsoft.com/office/drawing/2010/main" val="0"/>
+              </a:ext>
+            </a:extLst>
+          </a:blip>
+          <a:srcRect l="-115" r="15828" b="36435"/>
+          <a:stretch/>
+        </p:blipFill>
+        <p:spPr>
+          <a:xfrm>
+            <a:off x="1125460" y="643464"/>
+            <a:ext cx="9610344" cy="155448"/>
+          </a:xfrm>
+          <a:prstGeom prst="rect">
+            <a:avLst/>
+          </a:prstGeom>
+          <a:noFill/>
+          <a:ln>
+            <a:noFill/>
+          </a:ln>
+        </p:spPr>
+      </p:pic>
+      <p:sp useBgFill="1">
+        <p:nvSpPr>
+          <p:cNvPr id="17" name="Rectangle 16">
+            <a:extLst>
+              <a:ext uri="{FF2B5EF4-FFF2-40B4-BE49-F238E27FC236}">
+                <a16:creationId xmlns:a16="http://schemas.microsoft.com/office/drawing/2014/main" id="{2AA0E174-1032-45EB-8FEE-2178019BAECE}"/>
+              </a:ext>
+              <a:ext uri="{C183D7F6-B498-43B3-948B-1728B52AA6E4}">
+                <adec:decorative xmlns:adec="http://schemas.microsoft.com/office/drawing/2017/decorative" val="1"/>
+              </a:ext>
+            </a:extLst>
+          </p:cNvPr>
+          <p:cNvSpPr>
+            <a:spLocks noGrp="1" noRot="1" noChangeAspect="1" noMove="1" noResize="1" noEditPoints="1" noAdjustHandles="1" noChangeArrowheads="1" noChangeShapeType="1" noTextEdit="1"/>
+          </p:cNvSpPr>
+          <p:nvPr>
+            <p:extLst>
+              <p:ext uri="{386F3935-93C4-4BCD-93E2-E3B085C9AB24}">
+                <p16:designElem xmlns:p16="http://schemas.microsoft.com/office/powerpoint/2015/main" val="1"/>
+              </p:ext>
+            </p:extLst>
+          </p:nvPr>
+        </p:nvSpPr>
+        <p:spPr>
+          <a:xfrm>
+            <a:off x="2" y="0"/>
+            <a:ext cx="12191695" cy="6858000"/>
+          </a:xfrm>
+          <a:prstGeom prst="rect">
+            <a:avLst/>
+          </a:prstGeom>
+          <a:ln>
+            <a:noFill/>
+          </a:ln>
+        </p:spPr>
+        <p:style>
+          <a:lnRef idx="2">
+            <a:schemeClr val="accent1">
+              <a:shade val="50000"/>
+            </a:schemeClr>
+          </a:lnRef>
+          <a:fillRef idx="1">
+            <a:schemeClr val="accent1"/>
+          </a:fillRef>
+          <a:effectRef idx="0">
+            <a:schemeClr val="accent1"/>
+          </a:effectRef>
+          <a:fontRef idx="minor">
+            <a:schemeClr val="lt1"/>
+          </a:fontRef>
+        </p:style>
+        <p:txBody>
+          <a:bodyPr rtlCol="0" anchor="ctr"/>
+          <a:lstStyle/>
+          <a:p>
+            <a:pPr algn="ctr"/>
+            <a:endParaRPr lang="en-US"/>
+          </a:p>
+        </p:txBody>
+      </p:sp>
+      <p:sp>
+        <p:nvSpPr>
+          <p:cNvPr id="19" name="Rectangle 18">
+            <a:extLst>
+              <a:ext uri="{FF2B5EF4-FFF2-40B4-BE49-F238E27FC236}">
+                <a16:creationId xmlns:a16="http://schemas.microsoft.com/office/drawing/2014/main" id="{C017D167-735C-4828-BF61-5BEC0A93C01B}"/>
+              </a:ext>
+              <a:ext uri="{C183D7F6-B498-43B3-948B-1728B52AA6E4}">
+                <adec:decorative xmlns:adec="http://schemas.microsoft.com/office/drawing/2017/decorative" val="1"/>
+              </a:ext>
+            </a:extLst>
+          </p:cNvPr>
+          <p:cNvSpPr>
+            <a:spLocks noGrp="1" noRot="1" noChangeAspect="1" noMove="1" noResize="1" noEditPoints="1" noAdjustHandles="1" noChangeArrowheads="1" noChangeShapeType="1" noTextEdit="1"/>
+          </p:cNvSpPr>
+          <p:nvPr>
+            <p:extLst>
+              <p:ext uri="{386F3935-93C4-4BCD-93E2-E3B085C9AB24}">
+                <p16:designElem xmlns:p16="http://schemas.microsoft.com/office/powerpoint/2015/main" val="1"/>
+              </p:ext>
+            </p:extLst>
+          </p:nvPr>
+        </p:nvSpPr>
+        <p:spPr>
+          <a:xfrm>
+            <a:off x="0" y="468769"/>
+            <a:ext cx="12192000" cy="5647024"/>
+          </a:xfrm>
+          <a:prstGeom prst="rect">
+            <a:avLst/>
+          </a:prstGeom>
+          <a:gradFill flip="none" rotWithShape="1">
+            <a:gsLst>
+              <a:gs pos="0">
+                <a:schemeClr val="bg2">
+                  <a:alpha val="0"/>
+                  <a:lumMod val="100000"/>
+                </a:schemeClr>
+              </a:gs>
+              <a:gs pos="100000">
+                <a:schemeClr val="bg2">
+                  <a:lumMod val="95000"/>
+                  <a:lumOff val="5000"/>
+                </a:schemeClr>
+              </a:gs>
+            </a:gsLst>
+            <a:lin ang="5400000" scaled="0"/>
+            <a:tileRect/>
+          </a:gradFill>
+          <a:ln>
+            <a:noFill/>
+          </a:ln>
+        </p:spPr>
+        <p:style>
+          <a:lnRef idx="2">
+            <a:schemeClr val="accent1">
+              <a:shade val="50000"/>
+            </a:schemeClr>
+          </a:lnRef>
+          <a:fillRef idx="1">
+            <a:schemeClr val="accent1"/>
+          </a:fillRef>
+          <a:effectRef idx="0">
+            <a:schemeClr val="accent1"/>
+          </a:effectRef>
+          <a:fontRef idx="minor">
+            <a:schemeClr val="lt1"/>
+          </a:fontRef>
+        </p:style>
+        <p:txBody>
+          <a:bodyPr rtlCol="0" anchor="ctr"/>
+          <a:lstStyle/>
+          <a:p>
+            <a:pPr algn="ctr"/>
+            <a:endParaRPr lang="en-US"/>
+          </a:p>
+        </p:txBody>
+      </p:sp>
+      <p:sp>
+        <p:nvSpPr>
+          <p:cNvPr id="2" name="Title 1">
+            <a:extLst>
+              <a:ext uri="{FF2B5EF4-FFF2-40B4-BE49-F238E27FC236}">
+                <a16:creationId xmlns:a16="http://schemas.microsoft.com/office/drawing/2014/main" id="{911A11A2-76A9-4A8B-9CC5-233843DA755F}"/>
+              </a:ext>
+            </a:extLst>
+          </p:cNvPr>
+          <p:cNvSpPr>
+            <a:spLocks noGrp="1"/>
+          </p:cNvSpPr>
+          <p:nvPr>
+            <p:ph type="title"/>
+          </p:nvPr>
+        </p:nvSpPr>
+        <p:spPr>
+          <a:xfrm>
+            <a:off x="1128413" y="988098"/>
+            <a:ext cx="4495380" cy="3417056"/>
+          </a:xfrm>
+        </p:spPr>
+        <p:txBody>
+          <a:bodyPr vert="horz" lIns="91440" tIns="45720" rIns="91440" bIns="0" rtlCol="0" anchor="b">
+            <a:noAutofit/>
+          </a:bodyPr>
+          <a:lstStyle/>
+          <a:p>
+            <a:r>
+              <a:rPr lang="en-US" sz="2000"/>
+              <a:t>The </a:t>
+            </a:r>
+            <a:r>
+              <a:rPr lang="en-US" sz="2000" b="1"/>
+              <a:t>National Instant Criminal Background Check System</a:t>
+            </a:r>
+            <a:r>
+              <a:rPr lang="en-US" sz="2000"/>
+              <a:t> (</a:t>
+            </a:r>
+            <a:r>
+              <a:rPr lang="en-US" sz="2000" b="1"/>
+              <a:t>NICS</a:t>
+            </a:r>
+            <a:r>
+              <a:rPr lang="en-US" sz="2000"/>
+              <a:t>) is a United States system for determining if prospective firearms or explosives buyers' name and birth year match those of a person who is not eligible to buy. It was mandated by the </a:t>
+            </a:r>
+            <a:r>
+              <a:rPr lang="en-US" sz="2000">
+                <a:hlinkClick r:id="rId4" tooltip="Brady Handgun Violence Prevention Act"/>
+              </a:rPr>
+              <a:t>Brady Handgun Violence Prevention Act</a:t>
+            </a:r>
+            <a:r>
+              <a:rPr lang="en-US" sz="2000"/>
+              <a:t> (Brady Law) of 1993 and launched by the </a:t>
+            </a:r>
+            <a:r>
+              <a:rPr lang="en-US" sz="2000">
+                <a:hlinkClick r:id="rId5" tooltip="Federal Bureau of Investigation"/>
+              </a:rPr>
+              <a:t>Federal Bureau of Investigation</a:t>
+            </a:r>
+            <a:r>
+              <a:rPr lang="en-US" sz="2000"/>
+              <a:t> (FBI) in 1998. </a:t>
+            </a:r>
+            <a:endParaRPr lang="en-US" sz="2000" dirty="0"/>
+          </a:p>
+        </p:txBody>
+      </p:sp>
+      <p:sp>
+        <p:nvSpPr>
+          <p:cNvPr id="3" name="Text Placeholder 2">
+            <a:extLst>
+              <a:ext uri="{FF2B5EF4-FFF2-40B4-BE49-F238E27FC236}">
+                <a16:creationId xmlns:a16="http://schemas.microsoft.com/office/drawing/2014/main" id="{905B9236-7328-4440-8DF5-13A6B4A7E75A}"/>
+              </a:ext>
+            </a:extLst>
+          </p:cNvPr>
+          <p:cNvSpPr>
+            <a:spLocks noGrp="1"/>
+          </p:cNvSpPr>
+          <p:nvPr>
+            <p:ph type="body" idx="1"/>
+          </p:nvPr>
+        </p:nvSpPr>
+        <p:spPr>
+          <a:xfrm>
+            <a:off x="1128415" y="4873923"/>
+            <a:ext cx="4495378" cy="240444"/>
+          </a:xfrm>
+        </p:spPr>
+        <p:txBody>
+          <a:bodyPr vert="horz" lIns="91440" tIns="91440" rIns="91440" bIns="91440" rtlCol="0">
+            <a:normAutofit fontScale="25000" lnSpcReduction="20000"/>
+          </a:bodyPr>
+          <a:lstStyle/>
+          <a:p>
+            <a:endParaRPr lang="en-US" sz="1600" dirty="0"/>
+          </a:p>
+        </p:txBody>
+      </p:sp>
+      <p:pic>
+        <p:nvPicPr>
+          <p:cNvPr id="21" name="Picture 20">
+            <a:extLst>
+              <a:ext uri="{FF2B5EF4-FFF2-40B4-BE49-F238E27FC236}">
+                <a16:creationId xmlns:a16="http://schemas.microsoft.com/office/drawing/2014/main" id="{48A2A651-3D77-45F6-9A25-3762F5E46633}"/>
+              </a:ext>
+              <a:ext uri="{C183D7F6-B498-43B3-948B-1728B52AA6E4}">
+                <adec:decorative xmlns:adec="http://schemas.microsoft.com/office/drawing/2017/decorative" val="1"/>
+              </a:ext>
+            </a:extLst>
+          </p:cNvPr>
+          <p:cNvPicPr>
+            <a:picLocks noGrp="1" noRot="1" noChangeAspect="1" noMove="1" noResize="1" noEditPoints="1" noAdjustHandles="1" noChangeArrowheads="1" noChangeShapeType="1" noCrop="1"/>
+          </p:cNvPicPr>
+          <p:nvPr>
+            <p:extLst>
+              <p:ext uri="{386F3935-93C4-4BCD-93E2-E3B085C9AB24}">
+                <p16:designElem xmlns:p16="http://schemas.microsoft.com/office/powerpoint/2015/main" val="1"/>
+              </p:ext>
+            </p:extLst>
+          </p:nvPr>
+        </p:nvPicPr>
+        <p:blipFill rotWithShape="1">
+          <a:blip r:embed="rId3">
+            <a:duotone>
+              <a:schemeClr val="accent1">
+                <a:shade val="45000"/>
+                <a:satMod val="135000"/>
+              </a:schemeClr>
+              <a:prstClr val="white"/>
+            </a:duotone>
+            <a:extLst>
+              <a:ext uri="{28A0092B-C50C-407E-A947-70E740481C1C}">
+                <a14:useLocalDpi xmlns:a14="http://schemas.microsoft.com/office/drawing/2010/main" val="0"/>
+              </a:ext>
+            </a:extLst>
+          </a:blip>
+          <a:srcRect l="-115" t="474" r="60418" b="36564"/>
+          <a:stretch/>
+        </p:blipFill>
+        <p:spPr>
+          <a:xfrm>
+            <a:off x="1125460" y="643464"/>
+            <a:ext cx="4526280" cy="155448"/>
+          </a:xfrm>
+          <a:prstGeom prst="rect">
+            <a:avLst/>
+          </a:prstGeom>
+          <a:noFill/>
+          <a:ln>
+            <a:noFill/>
+          </a:ln>
+        </p:spPr>
+      </p:pic>
+      <p:pic>
+        <p:nvPicPr>
+          <p:cNvPr id="23" name="Picture 22">
+            <a:extLst>
+              <a:ext uri="{FF2B5EF4-FFF2-40B4-BE49-F238E27FC236}">
+                <a16:creationId xmlns:a16="http://schemas.microsoft.com/office/drawing/2014/main" id="{EE1B9172-598D-41CA-A120-1347A28BA08B}"/>
+              </a:ext>
+              <a:ext uri="{C183D7F6-B498-43B3-948B-1728B52AA6E4}">
+                <adec:decorative xmlns:adec="http://schemas.microsoft.com/office/drawing/2017/decorative" val="1"/>
+              </a:ext>
+            </a:extLst>
+          </p:cNvPr>
+          <p:cNvPicPr>
+            <a:picLocks noGrp="1" noRot="1" noChangeAspect="1" noMove="1" noResize="1" noEditPoints="1" noAdjustHandles="1" noChangeArrowheads="1" noChangeShapeType="1" noCrop="1"/>
+          </p:cNvPicPr>
+          <p:nvPr>
+            <p:extLst>
+              <p:ext uri="{386F3935-93C4-4BCD-93E2-E3B085C9AB24}">
+                <p16:designElem xmlns:p16="http://schemas.microsoft.com/office/powerpoint/2015/main" val="1"/>
+              </p:ext>
+            </p:extLst>
+          </p:nvPr>
+        </p:nvPicPr>
+        <p:blipFill rotWithShape="1">
+          <a:blip r:embed="rId2">
+            <a:extLst>
+              <a:ext uri="{28A0092B-C50C-407E-A947-70E740481C1C}">
+                <a14:useLocalDpi xmlns:a14="http://schemas.microsoft.com/office/drawing/2010/main" val="0"/>
+              </a:ext>
+            </a:extLst>
+          </a:blip>
+          <a:srcRect t="1538" b="-1538"/>
+          <a:stretch/>
+        </p:blipFill>
+        <p:spPr>
+          <a:xfrm>
+            <a:off x="0" y="6119336"/>
+            <a:ext cx="12192000" cy="742950"/>
+          </a:xfrm>
+          <a:prstGeom prst="rect">
+            <a:avLst/>
+          </a:prstGeom>
+        </p:spPr>
+      </p:pic>
+      <p:cxnSp>
+        <p:nvCxnSpPr>
+          <p:cNvPr id="25" name="Straight Connector 24">
+            <a:extLst>
+              <a:ext uri="{FF2B5EF4-FFF2-40B4-BE49-F238E27FC236}">
+                <a16:creationId xmlns:a16="http://schemas.microsoft.com/office/drawing/2014/main" id="{FD3493C9-FDB6-46AD-891A-36C02F24D8CC}"/>
+              </a:ext>
+              <a:ext uri="{C183D7F6-B498-43B3-948B-1728B52AA6E4}">
+                <adec:decorative xmlns:adec="http://schemas.microsoft.com/office/drawing/2017/decorative" val="1"/>
+              </a:ext>
+            </a:extLst>
+          </p:cNvPr>
+          <p:cNvCxnSpPr>
+            <a:cxnSpLocks noGrp="1" noRot="1" noChangeAspect="1" noMove="1" noResize="1" noEditPoints="1" noAdjustHandles="1" noChangeArrowheads="1" noChangeShapeType="1"/>
+          </p:cNvCxnSpPr>
+          <p:nvPr>
+            <p:extLst>
+              <p:ext uri="{386F3935-93C4-4BCD-93E2-E3B085C9AB24}">
+                <p16:designElem xmlns:p16="http://schemas.microsoft.com/office/powerpoint/2015/main" val="1"/>
+              </p:ext>
+            </p:extLst>
+          </p:nvPr>
+        </p:nvCxnSpPr>
+        <p:spPr>
+          <a:xfrm>
+            <a:off x="0" y="6121269"/>
+            <a:ext cx="12192000" cy="0"/>
+          </a:xfrm>
+          <a:prstGeom prst="line">
+            <a:avLst/>
+          </a:prstGeom>
+          <a:ln w="12700">
+            <a:solidFill>
+              <a:srgbClr val="000001">
+                <a:alpha val="20000"/>
+              </a:srgbClr>
+            </a:solidFill>
+          </a:ln>
+        </p:spPr>
+        <p:style>
+          <a:lnRef idx="1">
+            <a:schemeClr val="accent1"/>
+          </a:lnRef>
+          <a:fillRef idx="0">
+            <a:schemeClr val="accent1"/>
+          </a:fillRef>
+          <a:effectRef idx="0">
+            <a:schemeClr val="accent1"/>
+          </a:effectRef>
+          <a:fontRef idx="minor">
+            <a:schemeClr val="tx1"/>
+          </a:fontRef>
+        </p:style>
+      </p:cxnSp>
+      <p:pic>
+        <p:nvPicPr>
+          <p:cNvPr id="5" name="Picture 4">
+            <a:extLst>
+              <a:ext uri="{FF2B5EF4-FFF2-40B4-BE49-F238E27FC236}">
+                <a16:creationId xmlns:a16="http://schemas.microsoft.com/office/drawing/2014/main" id="{AFEE0ECE-8F77-4B67-964D-83DEE19DBD12}"/>
+              </a:ext>
+            </a:extLst>
+          </p:cNvPr>
+          <p:cNvPicPr>
+            <a:picLocks noChangeAspect="1"/>
+          </p:cNvPicPr>
+          <p:nvPr/>
+        </p:nvPicPr>
+        <p:blipFill>
+          <a:blip r:embed="rId6"/>
+          <a:stretch>
+            <a:fillRect/>
+          </a:stretch>
+        </p:blipFill>
+        <p:spPr>
+          <a:xfrm>
+            <a:off x="6095849" y="889724"/>
+            <a:ext cx="5397865" cy="4045829"/>
+          </a:xfrm>
+          <a:prstGeom prst="rect">
+            <a:avLst/>
+          </a:prstGeom>
+        </p:spPr>
+      </p:pic>
+    </p:spTree>
+    <p:extLst>
+      <p:ext uri="{BB962C8B-B14F-4D97-AF65-F5344CB8AC3E}">
+        <p14:creationId xmlns:p14="http://schemas.microsoft.com/office/powerpoint/2010/main" val="2798372022"/>
       </p:ext>
     </p:extLst>
   </p:cSld>
@@ -4477,34 +5337,6 @@
           <a:chExt cx="0" cy="0"/>
         </a:xfrm>
       </p:grpSpPr>
-      <p:pic>
-        <p:nvPicPr>
-          <p:cNvPr id="5" name="Content Placeholder 4" descr="A screenshot of a cell phone&#10;&#10;Description automatically generated">
-            <a:extLst>
-              <a:ext uri="{FF2B5EF4-FFF2-40B4-BE49-F238E27FC236}">
-                <a16:creationId xmlns:a16="http://schemas.microsoft.com/office/drawing/2014/main" id="{26BC0733-7E68-4226-95DD-0EEA1428DF02}"/>
-              </a:ext>
-            </a:extLst>
-          </p:cNvPr>
-          <p:cNvPicPr>
-            <a:picLocks noGrp="1" noChangeAspect="1"/>
-          </p:cNvPicPr>
-          <p:nvPr>
-            <p:ph idx="1"/>
-          </p:nvPr>
-        </p:nvPicPr>
-        <p:blipFill rotWithShape="1">
-          <a:blip r:embed="rId2"/>
-          <a:srcRect t="7713" b="6537"/>
-          <a:stretch/>
-        </p:blipFill>
-        <p:spPr>
-          <a:xfrm>
-            <a:off x="2057402" y="1500326"/>
-            <a:ext cx="7648575" cy="4450819"/>
-          </a:xfrm>
-        </p:spPr>
-      </p:pic>
       <p:sp>
         <p:nvSpPr>
           <p:cNvPr id="6" name="Rectangle 5">
@@ -4535,46 +5367,40 @@
             <a:pPr algn="ctr"/>
             <a:r>
               <a:rPr lang="en-US" b="1" dirty="0"/>
-              <a:t>Line Graph of Gun Registration</a:t>
-            </a:r>
-          </a:p>
-        </p:txBody>
-      </p:sp>
-      <p:sp>
-        <p:nvSpPr>
-          <p:cNvPr id="7" name="Rectangle 6">
+              <a:t>Complete history of background checks in the USA</a:t>
+            </a:r>
+          </a:p>
+        </p:txBody>
+      </p:sp>
+      <p:pic>
+        <p:nvPicPr>
+          <p:cNvPr id="8" name="Content Placeholder 7" descr="A screenshot of a cell phone&#10;&#10;Description automatically generated">
             <a:extLst>
               <a:ext uri="{FF2B5EF4-FFF2-40B4-BE49-F238E27FC236}">
-                <a16:creationId xmlns:a16="http://schemas.microsoft.com/office/drawing/2014/main" id="{1FE9EF7F-9F5A-46AF-87C2-D0A02E51E56D}"/>
+                <a16:creationId xmlns:a16="http://schemas.microsoft.com/office/drawing/2014/main" id="{821B21C3-6596-4F89-8E58-24396E6070B5}"/>
               </a:ext>
             </a:extLst>
           </p:cNvPr>
-          <p:cNvSpPr/>
-          <p:nvPr/>
-        </p:nvSpPr>
-        <p:spPr>
-          <a:xfrm>
-            <a:off x="9789043" y="2213351"/>
-            <a:ext cx="1704513" cy="1754326"/>
-          </a:xfrm>
-          <a:prstGeom prst="rect">
-            <a:avLst/>
-          </a:prstGeom>
-        </p:spPr>
-        <p:txBody>
-          <a:bodyPr wrap="square">
-            <a:spAutoFit/>
-          </a:bodyPr>
-          <a:lstStyle/>
-          <a:p>
-            <a:pPr algn="ctr"/>
-            <a:r>
-              <a:rPr lang="en-US" dirty="0"/>
-              <a:t>Red lines correlate to 2012 and 2016 Presidential Election</a:t>
-            </a:r>
-          </a:p>
-        </p:txBody>
-      </p:sp>
+          <p:cNvPicPr>
+            <a:picLocks noGrp="1" noChangeAspect="1"/>
+          </p:cNvPicPr>
+          <p:nvPr>
+            <p:ph idx="1"/>
+          </p:nvPr>
+        </p:nvPicPr>
+        <p:blipFill>
+          <a:blip r:embed="rId2"/>
+          <a:stretch>
+            <a:fillRect/>
+          </a:stretch>
+        </p:blipFill>
+        <p:spPr>
+          <a:xfrm>
+            <a:off x="883920" y="1513840"/>
+            <a:ext cx="10830560" cy="3951923"/>
+          </a:xfrm>
+        </p:spPr>
+      </p:pic>
     </p:spTree>
     <p:extLst>
       <p:ext uri="{BB962C8B-B14F-4D97-AF65-F5344CB8AC3E}">
@@ -4605,12 +5431,40 @@
           <a:chExt cx="0" cy="0"/>
         </a:xfrm>
       </p:grpSpPr>
+      <p:sp>
+        <p:nvSpPr>
+          <p:cNvPr id="2" name="Title 1">
+            <a:extLst>
+              <a:ext uri="{FF2B5EF4-FFF2-40B4-BE49-F238E27FC236}">
+                <a16:creationId xmlns:a16="http://schemas.microsoft.com/office/drawing/2014/main" id="{47C7FCB0-AD29-420F-9A3F-1DE56CCFE8B2}"/>
+              </a:ext>
+            </a:extLst>
+          </p:cNvPr>
+          <p:cNvSpPr>
+            <a:spLocks noGrp="1"/>
+          </p:cNvSpPr>
+          <p:nvPr>
+            <p:ph type="title"/>
+          </p:nvPr>
+        </p:nvSpPr>
+        <p:spPr/>
+        <p:txBody>
+          <a:bodyPr/>
+          <a:lstStyle/>
+          <a:p>
+            <a:r>
+              <a:rPr lang="en-US" dirty="0"/>
+              <a:t>NICS Background Checks 2011-2017</a:t>
+            </a:r>
+          </a:p>
+        </p:txBody>
+      </p:sp>
       <p:pic>
         <p:nvPicPr>
-          <p:cNvPr id="5" name="Content Placeholder 4" descr="A screenshot of a cell phone&#10;&#10;Description automatically generated">
+          <p:cNvPr id="5" name="Content Placeholder 4" descr="A screenshot of text&#10;&#10;Description automatically generated">
             <a:extLst>
               <a:ext uri="{FF2B5EF4-FFF2-40B4-BE49-F238E27FC236}">
-                <a16:creationId xmlns:a16="http://schemas.microsoft.com/office/drawing/2014/main" id="{F4484036-EE9B-4C47-990E-23D94173D970}"/>
+                <a16:creationId xmlns:a16="http://schemas.microsoft.com/office/drawing/2014/main" id="{BBD3480D-95B0-46BD-B84B-054675F968C2}"/>
               </a:ext>
             </a:extLst>
           </p:cNvPr>
@@ -4621,92 +5475,23 @@
             <p:ph idx="1"/>
           </p:nvPr>
         </p:nvPicPr>
-        <p:blipFill rotWithShape="1">
+        <p:blipFill>
           <a:blip r:embed="rId2"/>
-          <a:srcRect t="6623" b="6209"/>
-          <a:stretch/>
+          <a:stretch>
+            <a:fillRect/>
+          </a:stretch>
         </p:blipFill>
         <p:spPr>
           <a:xfrm>
-            <a:off x="2121764" y="1633491"/>
-            <a:ext cx="7667277" cy="4317651"/>
+            <a:off x="1130270" y="1866900"/>
+            <a:ext cx="9785380" cy="3598863"/>
           </a:xfrm>
         </p:spPr>
       </p:pic>
-      <p:sp>
-        <p:nvSpPr>
-          <p:cNvPr id="6" name="Rectangle 5">
-            <a:extLst>
-              <a:ext uri="{FF2B5EF4-FFF2-40B4-BE49-F238E27FC236}">
-                <a16:creationId xmlns:a16="http://schemas.microsoft.com/office/drawing/2014/main" id="{6092711E-B520-4293-BCBE-828E3204AE9F}"/>
-              </a:ext>
-            </a:extLst>
-          </p:cNvPr>
-          <p:cNvSpPr/>
-          <p:nvPr/>
-        </p:nvSpPr>
-        <p:spPr>
-          <a:xfrm>
-            <a:off x="2350017" y="906857"/>
-            <a:ext cx="7439024" cy="646331"/>
-          </a:xfrm>
-          <a:prstGeom prst="rect">
-            <a:avLst/>
-          </a:prstGeom>
-        </p:spPr>
-        <p:txBody>
-          <a:bodyPr wrap="square">
-            <a:spAutoFit/>
-          </a:bodyPr>
-          <a:lstStyle/>
-          <a:p>
-            <a:pPr algn="ctr"/>
-            <a:r>
-              <a:rPr lang="en-US" b="1" dirty="0"/>
-              <a:t>Plot the National Incident Based Reporting System (NIBRS) - Violent Crimes Data </a:t>
-            </a:r>
-          </a:p>
-        </p:txBody>
-      </p:sp>
-      <p:sp>
-        <p:nvSpPr>
-          <p:cNvPr id="7" name="Rectangle 6">
-            <a:extLst>
-              <a:ext uri="{FF2B5EF4-FFF2-40B4-BE49-F238E27FC236}">
-                <a16:creationId xmlns:a16="http://schemas.microsoft.com/office/drawing/2014/main" id="{AC1B8A79-C206-4983-9982-0FA980BB845A}"/>
-              </a:ext>
-            </a:extLst>
-          </p:cNvPr>
-          <p:cNvSpPr/>
-          <p:nvPr/>
-        </p:nvSpPr>
-        <p:spPr>
-          <a:xfrm>
-            <a:off x="10117517" y="2551837"/>
-            <a:ext cx="1704513" cy="1754326"/>
-          </a:xfrm>
-          <a:prstGeom prst="rect">
-            <a:avLst/>
-          </a:prstGeom>
-        </p:spPr>
-        <p:txBody>
-          <a:bodyPr wrap="square">
-            <a:spAutoFit/>
-          </a:bodyPr>
-          <a:lstStyle/>
-          <a:p>
-            <a:pPr algn="ctr"/>
-            <a:r>
-              <a:rPr lang="en-US" dirty="0"/>
-              <a:t>Red lines correlate to 2012 and 2016 Presidential Election</a:t>
-            </a:r>
-          </a:p>
-        </p:txBody>
-      </p:sp>
     </p:spTree>
     <p:extLst>
       <p:ext uri="{BB962C8B-B14F-4D97-AF65-F5344CB8AC3E}">
-        <p14:creationId xmlns:p14="http://schemas.microsoft.com/office/powerpoint/2010/main" val="633102965"/>
+        <p14:creationId xmlns:p14="http://schemas.microsoft.com/office/powerpoint/2010/main" val="2218835406"/>
       </p:ext>
     </p:extLst>
   </p:cSld>
@@ -4738,7 +5523,7 @@
           <p:cNvPr id="2" name="Title 1">
             <a:extLst>
               <a:ext uri="{FF2B5EF4-FFF2-40B4-BE49-F238E27FC236}">
-                <a16:creationId xmlns:a16="http://schemas.microsoft.com/office/drawing/2014/main" id="{871AFE62-1177-4408-A28F-EF30AA4C24FA}"/>
+                <a16:creationId xmlns:a16="http://schemas.microsoft.com/office/drawing/2014/main" id="{81494C39-F00D-4590-B658-98BECFA51AE0}"/>
               </a:ext>
             </a:extLst>
           </p:cNvPr>
@@ -4751,8 +5536,8 @@
         </p:nvSpPr>
         <p:spPr>
           <a:xfrm>
-            <a:off x="1129166" y="841732"/>
-            <a:ext cx="8619060" cy="444145"/>
+            <a:off x="1129167" y="1756129"/>
+            <a:ext cx="8619060" cy="3701696"/>
           </a:xfrm>
         </p:spPr>
         <p:txBody>
@@ -4761,23 +5546,106 @@
           </a:bodyPr>
           <a:lstStyle/>
           <a:p>
+            <a:r>
+              <a:rPr lang="en-US" sz="2000" b="1" dirty="0"/>
+              <a:t>Prohibited persons</a:t>
+            </a:r>
             <a:br>
-              <a:rPr lang="en-US" dirty="0">
-                <a:latin typeface="Cambria" panose="02040503050406030204" pitchFamily="18" charset="0"/>
-                <a:ea typeface="Cambria" panose="02040503050406030204" pitchFamily="18" charset="0"/>
+              <a:rPr lang="en-US" sz="2000" b="1" dirty="0"/>
+            </a:br>
+            <a:br>
+              <a:rPr lang="en-US" sz="2000" dirty="0"/>
+            </a:br>
+            <a:r>
+              <a:rPr lang="en-US" sz="1800" dirty="0"/>
+              <a:t>A prohibited person is one who: </a:t>
+            </a:r>
+            <a:br>
+              <a:rPr lang="en-US" sz="1800" dirty="0"/>
+            </a:br>
+            <a:r>
+              <a:rPr lang="en-US" sz="1800" dirty="0"/>
+              <a:t>Has been convicted in any court of a crime punishable by imprisonment for a term exceeding one year;</a:t>
+            </a:r>
+            <a:br>
+              <a:rPr lang="en-US" sz="1800" dirty="0"/>
+            </a:br>
+            <a:r>
+              <a:rPr lang="en-US" sz="1800" dirty="0"/>
+              <a:t>Is under indictment for a crime punishable by imprisonment for a term exceeding one year;</a:t>
+            </a:r>
+            <a:br>
+              <a:rPr lang="en-US" sz="1800" dirty="0"/>
+            </a:br>
+            <a:r>
+              <a:rPr lang="en-US" sz="1800" dirty="0"/>
+              <a:t>Is a fugitive from justice;</a:t>
+            </a:r>
+            <a:br>
+              <a:rPr lang="en-US" sz="1800" dirty="0"/>
+            </a:br>
+            <a:r>
+              <a:rPr lang="en-US" sz="1800" dirty="0"/>
+              <a:t>Is an unlawful user of or addicted to any controlled substance;</a:t>
+            </a:r>
+            <a:br>
+              <a:rPr lang="en-US" sz="1800" dirty="0"/>
+            </a:br>
+            <a:r>
+              <a:rPr lang="en-US" sz="1800" dirty="0"/>
+              <a:t>Has been adjudicated as a mental defective or committed to a mental institution;</a:t>
+            </a:r>
+            <a:br>
+              <a:rPr lang="en-US" sz="1800" dirty="0"/>
+            </a:br>
+            <a:r>
+              <a:rPr lang="en-US" sz="1800" dirty="0"/>
+              <a:t>Is illegally or unlawfully in the United States;</a:t>
+            </a:r>
+            <a:br>
+              <a:rPr lang="en-US" sz="1800" dirty="0"/>
+            </a:br>
+            <a:r>
+              <a:rPr lang="en-US" sz="1800" dirty="0"/>
+              <a:t>Has been discharged from the Armed Forces under dishonorable conditions;</a:t>
+            </a:r>
+            <a:br>
+              <a:rPr lang="en-US" sz="1800" dirty="0"/>
+            </a:br>
+            <a:r>
+              <a:rPr lang="en-US" sz="1800" dirty="0"/>
+              <a:t>Having been a citizen of the United States, has renounced U.S. citizenship;</a:t>
+            </a:r>
+            <a:br>
+              <a:rPr lang="en-US" sz="1800" dirty="0"/>
+            </a:br>
+            <a:r>
+              <a:rPr lang="en-US" sz="1800" dirty="0"/>
+              <a:t>Is subject to a court order that restrains the person from harassing, stalking, or threatening an intimate partner or child of such intimate partner;</a:t>
+            </a:r>
+            <a:br>
+              <a:rPr lang="en-US" sz="1800" dirty="0"/>
+            </a:br>
+            <a:r>
+              <a:rPr lang="en-US" sz="1800" dirty="0"/>
+              <a:t>Has been convicted in any court of a "misdemeanor crime of domestic violence", a defined term in 18 U.S.C. 921(a)(33)</a:t>
+            </a:r>
+            <a:r>
+              <a:rPr lang="en-US" sz="1800" baseline="30000" dirty="0">
+                <a:hlinkClick r:id="rId2"/>
               </a:rPr>
+              <a:t>[21</a:t>
+            </a:r>
+            <a:r>
+              <a:rPr lang="en-US" sz="2000" baseline="30000" dirty="0">
+                <a:hlinkClick r:id="rId2"/>
+              </a:rPr>
+              <a:t>]</a:t>
+            </a:r>
+            <a:br>
+              <a:rPr lang="en-US" dirty="0"/>
             </a:br>
-            <a:r>
-              <a:rPr lang="en-US" sz="2700" dirty="0">
-                <a:latin typeface="Cambria" panose="02040503050406030204" pitchFamily="18" charset="0"/>
-                <a:ea typeface="Cambria" panose="02040503050406030204" pitchFamily="18" charset="0"/>
-              </a:rPr>
-              <a:t>References:</a:t>
-            </a:r>
-            <a:endParaRPr lang="en-US" dirty="0">
-              <a:latin typeface="Cambria" panose="02040503050406030204" pitchFamily="18" charset="0"/>
-              <a:ea typeface="Cambria" panose="02040503050406030204" pitchFamily="18" charset="0"/>
-            </a:endParaRPr>
+            <a:endParaRPr lang="en-US" dirty="0"/>
           </a:p>
         </p:txBody>
       </p:sp>
@@ -4786,7 +5654,7 @@
           <p:cNvPr id="3" name="Text Placeholder 2">
             <a:extLst>
               <a:ext uri="{FF2B5EF4-FFF2-40B4-BE49-F238E27FC236}">
-                <a16:creationId xmlns:a16="http://schemas.microsoft.com/office/drawing/2014/main" id="{0E4F5FD9-B3FE-4E5E-8E72-026B7B315BEA}"/>
+                <a16:creationId xmlns:a16="http://schemas.microsoft.com/office/drawing/2014/main" id="{A50A3E86-2C51-4AF6-B560-8C9E693A3200}"/>
               </a:ext>
             </a:extLst>
           </p:cNvPr>
@@ -4798,31 +5666,153 @@
           </p:nvPr>
         </p:nvSpPr>
         <p:spPr>
-          <a:xfrm>
-            <a:off x="1129166" y="1514477"/>
-            <a:ext cx="8619060" cy="3304648"/>
+          <a:xfrm flipV="1">
+            <a:off x="1129166" y="5162549"/>
+            <a:ext cx="8619060" cy="295275"/>
           </a:xfrm>
         </p:spPr>
         <p:txBody>
           <a:bodyPr>
-            <a:normAutofit/>
+            <a:normAutofit fontScale="55000" lnSpcReduction="20000"/>
           </a:bodyPr>
           <a:lstStyle/>
           <a:p>
-            <a:r>
-              <a:rPr lang="en-US" sz="1400" dirty="0">
-                <a:latin typeface="Cambria" panose="02040503050406030204" pitchFamily="18" charset="0"/>
-                <a:ea typeface="Cambria" panose="02040503050406030204" pitchFamily="18" charset="0"/>
-              </a:rPr>
-              <a:t>CDC (2015). Injury mortality reports 1999 and onwards (USA). In Web-based Injury Statistics Query and Reporting System / CDC WISQARS. Atlanta: National Center for Injury Prevention and Control, Centers for Disease Control and Prevention / CDC. </a:t>
-            </a:r>
+            <a:endParaRPr lang="en-US" dirty="0"/>
           </a:p>
         </p:txBody>
       </p:sp>
     </p:spTree>
     <p:extLst>
       <p:ext uri="{BB962C8B-B14F-4D97-AF65-F5344CB8AC3E}">
-        <p14:creationId xmlns:p14="http://schemas.microsoft.com/office/powerpoint/2010/main" val="1521603729"/>
+        <p14:creationId xmlns:p14="http://schemas.microsoft.com/office/powerpoint/2010/main" val="3584022886"/>
+      </p:ext>
+    </p:extLst>
+  </p:cSld>
+  <p:clrMapOvr>
+    <a:masterClrMapping/>
+  </p:clrMapOvr>
+</p:sld>
+</file>
+
+<file path=ppt/slides/slide9.xml><?xml version="1.0" encoding="utf-8"?>
+<p:sld xmlns:a="http://schemas.openxmlformats.org/drawingml/2006/main" xmlns:r="http://schemas.openxmlformats.org/officeDocument/2006/relationships" xmlns:p="http://schemas.openxmlformats.org/presentationml/2006/main">
+  <p:cSld>
+    <p:spTree>
+      <p:nvGrpSpPr>
+        <p:cNvPr id="1" name=""/>
+        <p:cNvGrpSpPr/>
+        <p:nvPr/>
+      </p:nvGrpSpPr>
+      <p:grpSpPr>
+        <a:xfrm>
+          <a:off x="0" y="0"/>
+          <a:ext cx="0" cy="0"/>
+          <a:chOff x="0" y="0"/>
+          <a:chExt cx="0" cy="0"/>
+        </a:xfrm>
+      </p:grpSpPr>
+      <p:pic>
+        <p:nvPicPr>
+          <p:cNvPr id="5" name="Content Placeholder 4" descr="A screenshot of a cell phone&#10;&#10;Description automatically generated">
+            <a:extLst>
+              <a:ext uri="{FF2B5EF4-FFF2-40B4-BE49-F238E27FC236}">
+                <a16:creationId xmlns:a16="http://schemas.microsoft.com/office/drawing/2014/main" id="{F4484036-EE9B-4C47-990E-23D94173D970}"/>
+              </a:ext>
+            </a:extLst>
+          </p:cNvPr>
+          <p:cNvPicPr>
+            <a:picLocks noGrp="1" noChangeAspect="1"/>
+          </p:cNvPicPr>
+          <p:nvPr>
+            <p:ph idx="1"/>
+          </p:nvPr>
+        </p:nvPicPr>
+        <p:blipFill rotWithShape="1">
+          <a:blip r:embed="rId2"/>
+          <a:srcRect t="6623" b="6209"/>
+          <a:stretch/>
+        </p:blipFill>
+        <p:spPr>
+          <a:xfrm>
+            <a:off x="2121764" y="1633491"/>
+            <a:ext cx="7667277" cy="4317651"/>
+          </a:xfrm>
+        </p:spPr>
+      </p:pic>
+      <p:sp>
+        <p:nvSpPr>
+          <p:cNvPr id="6" name="Rectangle 5">
+            <a:extLst>
+              <a:ext uri="{FF2B5EF4-FFF2-40B4-BE49-F238E27FC236}">
+                <a16:creationId xmlns:a16="http://schemas.microsoft.com/office/drawing/2014/main" id="{6092711E-B520-4293-BCBE-828E3204AE9F}"/>
+              </a:ext>
+            </a:extLst>
+          </p:cNvPr>
+          <p:cNvSpPr/>
+          <p:nvPr/>
+        </p:nvSpPr>
+        <p:spPr>
+          <a:xfrm>
+            <a:off x="2350017" y="906857"/>
+            <a:ext cx="7439024" cy="646331"/>
+          </a:xfrm>
+          <a:prstGeom prst="rect">
+            <a:avLst/>
+          </a:prstGeom>
+        </p:spPr>
+        <p:txBody>
+          <a:bodyPr wrap="square">
+            <a:spAutoFit/>
+          </a:bodyPr>
+          <a:lstStyle/>
+          <a:p>
+            <a:pPr algn="ctr"/>
+            <a:r>
+              <a:rPr lang="en-US" b="1" dirty="0"/>
+              <a:t>Plot the National Incident Based Reporting System (NIBRS) - Violent Crimes Data </a:t>
+            </a:r>
+          </a:p>
+        </p:txBody>
+      </p:sp>
+      <p:sp>
+        <p:nvSpPr>
+          <p:cNvPr id="7" name="Rectangle 6">
+            <a:extLst>
+              <a:ext uri="{FF2B5EF4-FFF2-40B4-BE49-F238E27FC236}">
+                <a16:creationId xmlns:a16="http://schemas.microsoft.com/office/drawing/2014/main" id="{AC1B8A79-C206-4983-9982-0FA980BB845A}"/>
+              </a:ext>
+            </a:extLst>
+          </p:cNvPr>
+          <p:cNvSpPr/>
+          <p:nvPr/>
+        </p:nvSpPr>
+        <p:spPr>
+          <a:xfrm>
+            <a:off x="10117517" y="2551837"/>
+            <a:ext cx="1704513" cy="1754326"/>
+          </a:xfrm>
+          <a:prstGeom prst="rect">
+            <a:avLst/>
+          </a:prstGeom>
+        </p:spPr>
+        <p:txBody>
+          <a:bodyPr wrap="square">
+            <a:spAutoFit/>
+          </a:bodyPr>
+          <a:lstStyle/>
+          <a:p>
+            <a:pPr algn="ctr"/>
+            <a:r>
+              <a:rPr lang="en-US" dirty="0"/>
+              <a:t>Red lines correlate to 2012 and 2016 Presidential Election</a:t>
+            </a:r>
+          </a:p>
+        </p:txBody>
+      </p:sp>
+    </p:spTree>
+    <p:extLst>
+      <p:ext uri="{BB962C8B-B14F-4D97-AF65-F5344CB8AC3E}">
+        <p14:creationId xmlns:p14="http://schemas.microsoft.com/office/powerpoint/2010/main" val="633102965"/>
       </p:ext>
     </p:extLst>
   </p:cSld>

</xml_diff>

<commit_message>
added link related to facts
</commit_message>
<xml_diff>
--- a/Firearm Registration correlated to state_0725.pptx
+++ b/Firearm Registration correlated to state_0725.pptx
@@ -4044,21 +4044,7 @@
                 <a:latin typeface="Cambria" panose="02040503050406030204" pitchFamily="18" charset="0"/>
                 <a:ea typeface="Cambria" panose="02040503050406030204" pitchFamily="18" charset="0"/>
               </a:rPr>
-              <a:t>Approximately 30 million participating in firearms target </a:t>
-            </a:r>
-            <a:r>
-              <a:rPr lang="en-US">
-                <a:latin typeface="Cambria" panose="02040503050406030204" pitchFamily="18" charset="0"/>
-                <a:ea typeface="Cambria" panose="02040503050406030204" pitchFamily="18" charset="0"/>
-              </a:rPr>
-              <a:t>shoots in 2017(</a:t>
-            </a:r>
-            <a:r>
-              <a:rPr lang="en-US" dirty="0">
-                <a:latin typeface="Cambria" panose="02040503050406030204" pitchFamily="18" charset="0"/>
-                <a:ea typeface="Cambria" panose="02040503050406030204" pitchFamily="18" charset="0"/>
-              </a:rPr>
-              <a:t>Statista) .</a:t>
+              <a:t>Approximately 30 million participating in firearms target shoots in 2017(Statista).</a:t>
             </a:r>
           </a:p>
           <a:p>
@@ -4084,7 +4070,7 @@
                 <a:latin typeface="Cambria" panose="02040503050406030204" pitchFamily="18" charset="0"/>
                 <a:ea typeface="Cambria" panose="02040503050406030204" pitchFamily="18" charset="0"/>
               </a:rPr>
-              <a:t>10,982 murders by various firearms in 2017,  at least 7,032 by handguns (Statista) </a:t>
+              <a:t>10,982 murders by various firearms in 2017,  at least 7,032 by handguns (Statista). </a:t>
             </a:r>
           </a:p>
           <a:p>
@@ -4097,7 +4083,22 @@
                 <a:latin typeface="Cambria" panose="02040503050406030204" pitchFamily="18" charset="0"/>
                 <a:ea typeface="Cambria" panose="02040503050406030204" pitchFamily="18" charset="0"/>
               </a:rPr>
-              <a:t>In 2015, 2,824 children (age 0 to 19 years) died by gunshot and an additional 13,723 were injured.</a:t>
+              <a:t>In 2015, 2,824 children (age 0 to 19 years) died by gunshot and an additional 13,723 were injured (</a:t>
+            </a:r>
+            <a:r>
+              <a:rPr lang="en-US" dirty="0">
+                <a:latin typeface="Cambria" panose="02040503050406030204" pitchFamily="18" charset="0"/>
+                <a:ea typeface="Cambria" panose="02040503050406030204" pitchFamily="18" charset="0"/>
+                <a:hlinkClick r:id="rId2"/>
+              </a:rPr>
+              <a:t>injury.research.chop.edu</a:t>
+            </a:r>
+            <a:r>
+              <a:rPr lang="en-US" dirty="0">
+                <a:latin typeface="Cambria" panose="02040503050406030204" pitchFamily="18" charset="0"/>
+                <a:ea typeface="Cambria" panose="02040503050406030204" pitchFamily="18" charset="0"/>
+              </a:rPr>
+              <a:t>).</a:t>
             </a:r>
           </a:p>
           <a:p>
@@ -4110,7 +4111,22 @@
                 <a:latin typeface="Cambria" panose="02040503050406030204" pitchFamily="18" charset="0"/>
                 <a:ea typeface="Cambria" panose="02040503050406030204" pitchFamily="18" charset="0"/>
               </a:rPr>
-              <a:t>Approximately one of three handguns guns is kept loaded and unlocked and most children know where their parents keep their guns.</a:t>
+              <a:t>Approximately one of three handguns guns is kept loaded and unlocked and most children know where their parents keep their guns (</a:t>
+            </a:r>
+            <a:r>
+              <a:rPr lang="en-US" dirty="0">
+                <a:latin typeface="Cambria" panose="02040503050406030204" pitchFamily="18" charset="0"/>
+                <a:ea typeface="Cambria" panose="02040503050406030204" pitchFamily="18" charset="0"/>
+                <a:hlinkClick r:id="rId2"/>
+              </a:rPr>
+              <a:t>injury.research.chop.edu</a:t>
+            </a:r>
+            <a:r>
+              <a:rPr lang="en-US" dirty="0">
+                <a:latin typeface="Cambria" panose="02040503050406030204" pitchFamily="18" charset="0"/>
+                <a:ea typeface="Cambria" panose="02040503050406030204" pitchFamily="18" charset="0"/>
+              </a:rPr>
+              <a:t>).</a:t>
             </a:r>
           </a:p>
           <a:p>
@@ -4253,8 +4269,8 @@
         </p:nvSpPr>
         <p:spPr>
           <a:xfrm>
-            <a:off x="1129166" y="1514477"/>
-            <a:ext cx="8619060" cy="3304648"/>
+            <a:off x="1129166" y="1514476"/>
+            <a:ext cx="9834756" cy="4229375"/>
           </a:xfrm>
         </p:spPr>
         <p:txBody>
@@ -4318,13 +4334,26 @@
           </a:p>
           <a:p>
             <a:r>
-              <a:rPr lang="en-US" sz="1400" dirty="0"/>
-              <a:t>NICS &amp; NIBRS, www.fbi.gov</a:t>
+              <a:rPr lang="en-US" sz="1400" dirty="0">
+                <a:latin typeface="Cambria" panose="02040503050406030204" pitchFamily="18" charset="0"/>
+                <a:ea typeface="Cambria" panose="02040503050406030204" pitchFamily="18" charset="0"/>
+                <a:hlinkClick r:id="rId5"/>
+              </a:rPr>
+              <a:t>https://injury.research.chop.edu/violence-prevention-initiative/types-violence-involving-youth/gun-violence/gun-violence-facts-and#.XTuao-hKhPY</a:t>
             </a:r>
             <a:endParaRPr lang="en-US" sz="1400" dirty="0">
               <a:latin typeface="Cambria" panose="02040503050406030204" pitchFamily="18" charset="0"/>
               <a:ea typeface="Cambria" panose="02040503050406030204" pitchFamily="18" charset="0"/>
             </a:endParaRPr>
+          </a:p>
+          <a:p>
+            <a:r>
+              <a:rPr lang="en-US" sz="1400" dirty="0">
+                <a:latin typeface="Cambria" panose="02040503050406030204" pitchFamily="18" charset="0"/>
+                <a:ea typeface="Cambria" panose="02040503050406030204" pitchFamily="18" charset="0"/>
+              </a:rPr>
+              <a:t>NICS &amp; NIBRS, www.fbi.gov</a:t>
+            </a:r>
           </a:p>
         </p:txBody>
       </p:sp>
@@ -4816,38 +4845,6 @@
           </a:p>
         </p:txBody>
       </p:sp>
-      <p:sp>
-        <p:nvSpPr>
-          <p:cNvPr id="3" name="Text Placeholder 2">
-            <a:extLst>
-              <a:ext uri="{FF2B5EF4-FFF2-40B4-BE49-F238E27FC236}">
-                <a16:creationId xmlns:a16="http://schemas.microsoft.com/office/drawing/2014/main" id="{905B9236-7328-4440-8DF5-13A6B4A7E75A}"/>
-              </a:ext>
-            </a:extLst>
-          </p:cNvPr>
-          <p:cNvSpPr>
-            <a:spLocks noGrp="1"/>
-          </p:cNvSpPr>
-          <p:nvPr>
-            <p:ph type="body" idx="1"/>
-          </p:nvPr>
-        </p:nvSpPr>
-        <p:spPr>
-          <a:xfrm>
-            <a:off x="1128415" y="4873923"/>
-            <a:ext cx="4495378" cy="240444"/>
-          </a:xfrm>
-        </p:spPr>
-        <p:txBody>
-          <a:bodyPr vert="horz" lIns="91440" tIns="91440" rIns="91440" bIns="91440" rtlCol="0">
-            <a:normAutofit fontScale="25000" lnSpcReduction="20000"/>
-          </a:bodyPr>
-          <a:lstStyle/>
-          <a:p>
-            <a:endParaRPr lang="en-US" sz="1600" dirty="0"/>
-          </a:p>
-        </p:txBody>
-      </p:sp>
       <p:pic>
         <p:nvPicPr>
           <p:cNvPr id="21" name="Picture 20">
@@ -5550,8 +5547,8 @@
         </p:nvSpPr>
         <p:spPr>
           <a:xfrm>
-            <a:off x="1129167" y="1756129"/>
-            <a:ext cx="8619060" cy="3701696"/>
+            <a:off x="1129166" y="1756129"/>
+            <a:ext cx="9532915" cy="3701696"/>
           </a:xfrm>
         </p:spPr>
         <p:txBody>
@@ -5659,38 +5656,6 @@
             <a:br>
               <a:rPr lang="en-US" dirty="0"/>
             </a:br>
-            <a:endParaRPr lang="en-US" dirty="0"/>
-          </a:p>
-        </p:txBody>
-      </p:sp>
-      <p:sp>
-        <p:nvSpPr>
-          <p:cNvPr id="3" name="Text Placeholder 2">
-            <a:extLst>
-              <a:ext uri="{FF2B5EF4-FFF2-40B4-BE49-F238E27FC236}">
-                <a16:creationId xmlns:a16="http://schemas.microsoft.com/office/drawing/2014/main" id="{A50A3E86-2C51-4AF6-B560-8C9E693A3200}"/>
-              </a:ext>
-            </a:extLst>
-          </p:cNvPr>
-          <p:cNvSpPr>
-            <a:spLocks noGrp="1"/>
-          </p:cNvSpPr>
-          <p:nvPr>
-            <p:ph type="body" idx="1"/>
-          </p:nvPr>
-        </p:nvSpPr>
-        <p:spPr>
-          <a:xfrm flipV="1">
-            <a:off x="1129166" y="5162549"/>
-            <a:ext cx="8619060" cy="295275"/>
-          </a:xfrm>
-        </p:spPr>
-        <p:txBody>
-          <a:bodyPr>
-            <a:normAutofit fontScale="55000" lnSpcReduction="20000"/>
-          </a:bodyPr>
-          <a:lstStyle/>
-          <a:p>
             <a:endParaRPr lang="en-US" dirty="0"/>
           </a:p>
         </p:txBody>

</xml_diff>

<commit_message>
did some update on reference page
</commit_message>
<xml_diff>
--- a/Firearm Registration correlated to state_0725.pptx
+++ b/Firearm Registration correlated to state_0725.pptx
@@ -4294,7 +4294,7 @@
                 <a:ea typeface="Cambria" panose="02040503050406030204" pitchFamily="18" charset="0"/>
                 <a:hlinkClick r:id="rId2"/>
               </a:rPr>
-              <a:t>https://www.statista.com/statistics/249740/percentage-of-households-in-the-united-states-owning-a-firearm/</a:t>
+              <a:t>Percentage of households in the United States owning one or more firearms from 1972 to 2018</a:t>
             </a:r>
             <a:r>
               <a:rPr lang="en-US" sz="1400" dirty="0">
@@ -4311,7 +4311,7 @@
                 <a:ea typeface="Cambria" panose="02040503050406030204" pitchFamily="18" charset="0"/>
                 <a:hlinkClick r:id="rId3"/>
               </a:rPr>
-              <a:t>https://www.statista.com/statistics/191962/participants-in-target-shooting-in-the-us-since-2006/</a:t>
+              <a:t>Number of participants in target shooting in the United States from 2006 to 2017 (in millions)*</a:t>
             </a:r>
             <a:endParaRPr lang="en-US" sz="1400" dirty="0">
               <a:latin typeface="Cambria" panose="02040503050406030204" pitchFamily="18" charset="0"/>
@@ -4325,7 +4325,7 @@
                 <a:ea typeface="Cambria" panose="02040503050406030204" pitchFamily="18" charset="0"/>
                 <a:hlinkClick r:id="rId4"/>
               </a:rPr>
-              <a:t>https://www.statista.com/statistics/195325/murder-victims-in-the-us-by-weapon-used/</a:t>
+              <a:t>Number of murder victims in the United States in 2017, by weapon</a:t>
             </a:r>
             <a:endParaRPr lang="en-US" sz="1400" dirty="0">
               <a:latin typeface="Cambria" panose="02040503050406030204" pitchFamily="18" charset="0"/>
@@ -4339,7 +4339,7 @@
                 <a:ea typeface="Cambria" panose="02040503050406030204" pitchFamily="18" charset="0"/>
                 <a:hlinkClick r:id="rId5"/>
               </a:rPr>
-              <a:t>https://injury.research.chop.edu/violence-prevention-initiative/types-violence-involving-youth/gun-violence/gun-violence-facts-and#.XTuao-hKhPY</a:t>
+              <a:t>Gun Violence: Facts and Statistics</a:t>
             </a:r>
             <a:endParaRPr lang="en-US" sz="1400" dirty="0">
               <a:latin typeface="Cambria" panose="02040503050406030204" pitchFamily="18" charset="0"/>
@@ -5399,16 +5399,15 @@
             <p:ph idx="1"/>
           </p:nvPr>
         </p:nvPicPr>
-        <p:blipFill>
+        <p:blipFill rotWithShape="1">
           <a:blip r:embed="rId2"/>
-          <a:stretch>
-            <a:fillRect/>
-          </a:stretch>
+          <a:srcRect b="6217"/>
+          <a:stretch/>
         </p:blipFill>
         <p:spPr>
           <a:xfrm>
-            <a:off x="883920" y="1513840"/>
-            <a:ext cx="10830560" cy="3951923"/>
+            <a:off x="1171853" y="1513841"/>
+            <a:ext cx="9561250" cy="4212256"/>
           </a:xfrm>
         </p:spPr>
       </p:pic>
@@ -5458,13 +5457,20 @@
             <p:ph type="title"/>
           </p:nvPr>
         </p:nvSpPr>
-        <p:spPr/>
-        <p:txBody>
-          <a:bodyPr/>
-          <a:lstStyle/>
-          <a:p>
-            <a:r>
-              <a:rPr lang="en-US" dirty="0"/>
+        <p:spPr>
+          <a:xfrm>
+            <a:off x="3483946" y="985421"/>
+            <a:ext cx="5078027" cy="403934"/>
+          </a:xfrm>
+        </p:spPr>
+        <p:txBody>
+          <a:bodyPr>
+            <a:normAutofit/>
+          </a:bodyPr>
+          <a:lstStyle/>
+          <a:p>
+            <a:r>
+              <a:rPr lang="en-US" sz="1800" b="1" dirty="0"/>
               <a:t>NICS Background Checks 2011-2017</a:t>
             </a:r>
           </a:p>
@@ -5486,16 +5492,15 @@
             <p:ph idx="1"/>
           </p:nvPr>
         </p:nvPicPr>
-        <p:blipFill>
+        <p:blipFill rotWithShape="1">
           <a:blip r:embed="rId2"/>
-          <a:stretch>
-            <a:fillRect/>
-          </a:stretch>
+          <a:srcRect b="6580"/>
+          <a:stretch/>
         </p:blipFill>
         <p:spPr>
           <a:xfrm>
-            <a:off x="1130270" y="1866900"/>
-            <a:ext cx="9785380" cy="3598863"/>
+            <a:off x="1130270" y="1642368"/>
+            <a:ext cx="9602833" cy="4154749"/>
           </a:xfrm>
         </p:spPr>
       </p:pic>
@@ -5713,8 +5718,8 @@
         </p:blipFill>
         <p:spPr>
           <a:xfrm>
-            <a:off x="2121764" y="1633491"/>
-            <a:ext cx="7667277" cy="4317651"/>
+            <a:off x="1651248" y="1633491"/>
+            <a:ext cx="8137794" cy="4317651"/>
           </a:xfrm>
         </p:spPr>
       </p:pic>
@@ -5767,7 +5772,7 @@
         </p:nvSpPr>
         <p:spPr>
           <a:xfrm>
-            <a:off x="10117517" y="2551837"/>
+            <a:off x="9957719" y="2551837"/>
             <a:ext cx="1704513" cy="1754326"/>
           </a:xfrm>
           <a:prstGeom prst="rect">

</xml_diff>